<commit_message>
Implemented a simple GA which is not really (possibly similar problems as the hill climbing algorithm)
</commit_message>
<xml_diff>
--- a/Report, presentation and related stuff/Report figure 1.pptx
+++ b/Report, presentation and related stuff/Report figure 1.pptx
@@ -108,6 +108,11 @@
       </a:defRPr>
     </a:lvl9pPr>
   </p:defaultTextStyle>
+  <p:extLst>
+    <p:ext uri="{EFAFB233-063F-42B5-8137-9DF3F51BA10A}">
+      <p15:sldGuideLst xmlns:p15="http://schemas.microsoft.com/office/powerpoint/2012/main"/>
+    </p:ext>
+  </p:extLst>
 </p:presentation>
 </file>
 
@@ -4160,6 +4165,42 @@
       </p:grpSpPr>
       <p:cxnSp>
         <p:nvCxnSpPr>
+          <p:cNvPr id="17" name="Gerader Verbinder 16"/>
+          <p:cNvCxnSpPr/>
+          <p:nvPr/>
+        </p:nvCxnSpPr>
+        <p:spPr>
+          <a:xfrm flipH="1">
+            <a:off x="6491688" y="1977409"/>
+            <a:ext cx="529212" cy="566098"/>
+          </a:xfrm>
+          <a:prstGeom prst="line">
+            <a:avLst/>
+          </a:prstGeom>
+          <a:ln w="12700" cap="rnd">
+            <a:solidFill>
+              <a:schemeClr val="tx1"/>
+            </a:solidFill>
+            <a:headEnd type="triangle"/>
+          </a:ln>
+        </p:spPr>
+        <p:style>
+          <a:lnRef idx="1">
+            <a:schemeClr val="accent1"/>
+          </a:lnRef>
+          <a:fillRef idx="0">
+            <a:schemeClr val="accent1"/>
+          </a:fillRef>
+          <a:effectRef idx="0">
+            <a:schemeClr val="accent1"/>
+          </a:effectRef>
+          <a:fontRef idx="minor">
+            <a:schemeClr val="tx1"/>
+          </a:fontRef>
+        </p:style>
+      </p:cxnSp>
+      <p:cxnSp>
+        <p:nvCxnSpPr>
           <p:cNvPr id="2" name="Gerader Verbinder 1"/>
           <p:cNvCxnSpPr/>
           <p:nvPr/>
@@ -4330,36 +4371,6 @@
       </p:pic>
       <p:pic>
         <p:nvPicPr>
-          <p:cNvPr id="14" name="Grafik 13"/>
-          <p:cNvPicPr>
-            <a:picLocks noChangeAspect="1"/>
-          </p:cNvPicPr>
-          <p:nvPr/>
-        </p:nvPicPr>
-        <p:blipFill>
-          <a:blip r:embed="rId4" cstate="print">
-            <a:extLst>
-              <a:ext uri="{28A0092B-C50C-407E-A947-70E740481C1C}">
-                <a14:useLocalDpi xmlns:a14="http://schemas.microsoft.com/office/drawing/2010/main" val="0"/>
-              </a:ext>
-            </a:extLst>
-          </a:blip>
-          <a:stretch>
-            <a:fillRect/>
-          </a:stretch>
-        </p:blipFill>
-        <p:spPr>
-          <a:xfrm>
-            <a:off x="3038193" y="1665110"/>
-            <a:ext cx="1080000" cy="629865"/>
-          </a:xfrm>
-          <a:prstGeom prst="rect">
-            <a:avLst/>
-          </a:prstGeom>
-        </p:spPr>
-      </p:pic>
-      <p:pic>
-        <p:nvPicPr>
           <p:cNvPr id="15" name="Grafik 14"/>
           <p:cNvPicPr>
             <a:picLocks noChangeAspect="1"/>
@@ -4562,6 +4573,110 @@
           </a:p>
         </p:txBody>
       </p:sp>
+      <p:cxnSp>
+        <p:nvCxnSpPr>
+          <p:cNvPr id="23" name="Gerader Verbinder 22"/>
+          <p:cNvCxnSpPr/>
+          <p:nvPr/>
+        </p:nvCxnSpPr>
+        <p:spPr>
+          <a:xfrm flipH="1">
+            <a:off x="3530600" y="1977409"/>
+            <a:ext cx="3486728" cy="0"/>
+          </a:xfrm>
+          <a:prstGeom prst="line">
+            <a:avLst/>
+          </a:prstGeom>
+          <a:ln w="12700" cap="rnd">
+            <a:solidFill>
+              <a:schemeClr val="tx1"/>
+            </a:solidFill>
+            <a:headEnd type="none"/>
+            <a:tailEnd type="triangle"/>
+          </a:ln>
+        </p:spPr>
+        <p:style>
+          <a:lnRef idx="1">
+            <a:schemeClr val="accent1"/>
+          </a:lnRef>
+          <a:fillRef idx="0">
+            <a:schemeClr val="accent1"/>
+          </a:fillRef>
+          <a:effectRef idx="0">
+            <a:schemeClr val="accent1"/>
+          </a:effectRef>
+          <a:fontRef idx="minor">
+            <a:schemeClr val="tx1"/>
+          </a:fontRef>
+        </p:style>
+      </p:cxnSp>
+      <p:pic>
+        <p:nvPicPr>
+          <p:cNvPr id="14" name="Grafik 13"/>
+          <p:cNvPicPr>
+            <a:picLocks noChangeAspect="1"/>
+          </p:cNvPicPr>
+          <p:nvPr/>
+        </p:nvPicPr>
+        <p:blipFill>
+          <a:blip r:embed="rId4" cstate="print">
+            <a:extLst>
+              <a:ext uri="{28A0092B-C50C-407E-A947-70E740481C1C}">
+                <a14:useLocalDpi xmlns:a14="http://schemas.microsoft.com/office/drawing/2010/main" val="0"/>
+              </a:ext>
+            </a:extLst>
+          </a:blip>
+          <a:stretch>
+            <a:fillRect/>
+          </a:stretch>
+        </p:blipFill>
+        <p:spPr>
+          <a:xfrm>
+            <a:off x="3038193" y="1665110"/>
+            <a:ext cx="1080000" cy="629865"/>
+          </a:xfrm>
+          <a:prstGeom prst="rect">
+            <a:avLst/>
+          </a:prstGeom>
+        </p:spPr>
+      </p:pic>
+      <p:cxnSp>
+        <p:nvCxnSpPr>
+          <p:cNvPr id="25" name="Gerader Verbinder 24"/>
+          <p:cNvCxnSpPr/>
+          <p:nvPr/>
+        </p:nvCxnSpPr>
+        <p:spPr>
+          <a:xfrm>
+            <a:off x="3530600" y="1984540"/>
+            <a:ext cx="0" cy="1165857"/>
+          </a:xfrm>
+          <a:prstGeom prst="line">
+            <a:avLst/>
+          </a:prstGeom>
+          <a:ln w="12700" cap="rnd">
+            <a:solidFill>
+              <a:schemeClr val="tx1"/>
+            </a:solidFill>
+            <a:headEnd type="none"/>
+            <a:tailEnd type="triangle"/>
+          </a:ln>
+        </p:spPr>
+        <p:style>
+          <a:lnRef idx="1">
+            <a:schemeClr val="accent1"/>
+          </a:lnRef>
+          <a:fillRef idx="0">
+            <a:schemeClr val="accent1"/>
+          </a:fillRef>
+          <a:effectRef idx="0">
+            <a:schemeClr val="accent1"/>
+          </a:effectRef>
+          <a:fontRef idx="minor">
+            <a:schemeClr val="tx1"/>
+          </a:fontRef>
+        </p:style>
+      </p:cxnSp>
     </p:spTree>
     <p:extLst>
       <p:ext uri="{BB962C8B-B14F-4D97-AF65-F5344CB8AC3E}">

</xml_diff>